<commit_message>
fix slides, add problem sets to code
</commit_message>
<xml_diff>
--- a/powerpoint/Session1.pptx
+++ b/powerpoint/Session1.pptx
@@ -34,9 +34,8 @@
     <p:sldId id="275" r:id="rId28"/>
     <p:sldId id="277" r:id="rId29"/>
     <p:sldId id="278" r:id="rId30"/>
-    <p:sldId id="279" r:id="rId31"/>
-    <p:sldId id="280" r:id="rId32"/>
-    <p:sldId id="281" r:id="rId33"/>
+    <p:sldId id="280" r:id="rId31"/>
+    <p:sldId id="281" r:id="rId32"/>
   </p:sldIdLst>
   <p:sldSz cx="9144000" cy="6858000" type="screen4x3"/>
   <p:notesSz cx="7559675" cy="10691813"/>
@@ -135,6 +134,11 @@
       </a:defRPr>
     </a:lvl9pPr>
   </p:defaultTextStyle>
+  <p:extLst>
+    <p:ext uri="{EFAFB233-063F-42B5-8137-9DF3F51BA10A}">
+      <p15:sldGuideLst xmlns:p15="http://schemas.microsoft.com/office/powerpoint/2012/main"/>
+    </p:ext>
+  </p:extLst>
 </p:presentation>
 </file>
 
@@ -2951,8 +2955,8 @@
     </dgm:pt>
   </dgm:ptLst>
   <dgm:cxnLst>
+    <dgm:cxn modelId="{7E2FB463-21AF-491B-97D9-1BA1B9A5D663}" type="presOf" srcId="{8B1E528D-F277-45BC-AF74-F49409A78254}" destId="{49F48C19-315C-484C-933E-6822A0EDD643}" srcOrd="0" destOrd="0" presId="urn:microsoft.com/office/officeart/2005/8/layout/vList5"/>
     <dgm:cxn modelId="{7C1D8148-0123-4CFA-A0D7-87331B5E2DEA}" srcId="{95974D49-F6DF-460F-82E7-DC928EBF59EA}" destId="{2E40F792-DD91-48D8-AD91-794DC6C8CDF5}" srcOrd="0" destOrd="0" parTransId="{DA241C61-3E9E-40B5-8962-C02213D2BC44}" sibTransId="{3CFEDC67-90AD-484B-95F5-2F855EA6B658}"/>
-    <dgm:cxn modelId="{7E2FB463-21AF-491B-97D9-1BA1B9A5D663}" type="presOf" srcId="{8B1E528D-F277-45BC-AF74-F49409A78254}" destId="{49F48C19-315C-484C-933E-6822A0EDD643}" srcOrd="0" destOrd="0" presId="urn:microsoft.com/office/officeart/2005/8/layout/vList5"/>
     <dgm:cxn modelId="{C7DDF485-969B-487B-9A59-95A1E7A76441}" srcId="{8B1E528D-F277-45BC-AF74-F49409A78254}" destId="{95974D49-F6DF-460F-82E7-DC928EBF59EA}" srcOrd="1" destOrd="0" parTransId="{AC0B7F36-2FAE-405E-A16C-54D1DD977403}" sibTransId="{CE63092B-E540-4B6A-AA51-6501086CF0BF}"/>
     <dgm:cxn modelId="{D4CBCA8F-9246-4865-B8E4-2F9A9E15B999}" type="presOf" srcId="{AC7D689D-90B0-4633-A481-6E852D100C65}" destId="{6E01CFA3-4067-452D-AD4C-A07A32D98561}" srcOrd="0" destOrd="0" presId="urn:microsoft.com/office/officeart/2005/8/layout/vList5"/>
     <dgm:cxn modelId="{3F84E19D-36B4-4CAA-BE75-CE9FE8474E44}" type="presOf" srcId="{95974D49-F6DF-460F-82E7-DC928EBF59EA}" destId="{83809859-737B-46D6-8056-0B51D4541397}" srcOrd="0" destOrd="0" presId="urn:microsoft.com/office/officeart/2005/8/layout/vList5"/>
@@ -19855,7 +19859,7 @@
         </p:style>
         <p:txBody>
           <a:bodyPr lIns="90000" tIns="45000" rIns="90000" bIns="45000" anchor="ctr">
-            <a:normAutofit fontScale="73000" lnSpcReduction="10000"/>
+            <a:normAutofit fontScale="80500" lnSpcReduction="20000"/>
           </a:bodyPr>
           <a:lstStyle/>
           <a:p>
@@ -39948,7 +39952,7 @@
         </p:nvSpPr>
         <p:spPr>
           <a:xfrm>
-            <a:off x="457200" y="684000"/>
+            <a:off x="457200" y="-230400"/>
             <a:ext cx="8227800" cy="1143720"/>
           </a:xfrm>
           <a:prstGeom prst="rect">
@@ -39983,16 +39987,26 @@
               </a:lnSpc>
             </a:pPr>
             <a:r>
-              <a:rPr lang="en-GB" sz="4400" b="1" strike="noStrike" spc="-1">
+              <a:rPr lang="en-GB" sz="4400" b="1" strike="noStrike" spc="-1" dirty="0">
                 <a:solidFill>
                   <a:srgbClr val="000000"/>
                 </a:solidFill>
                 <a:latin typeface="Calibri"/>
                 <a:ea typeface="DejaVu Sans"/>
               </a:rPr>
-              <a:t>Filtering data.frame</a:t>
+              <a:t>Filtering a </a:t>
             </a:r>
-            <a:endParaRPr lang="en-GB" sz="4400" b="0" strike="noStrike" spc="-1">
+            <a:r>
+              <a:rPr lang="en-GB" sz="4400" b="1" strike="noStrike" spc="-1" dirty="0" err="1">
+                <a:solidFill>
+                  <a:srgbClr val="000000"/>
+                </a:solidFill>
+                <a:latin typeface="Calibri"/>
+                <a:ea typeface="DejaVu Sans"/>
+              </a:rPr>
+              <a:t>data.frame</a:t>
+            </a:r>
+            <a:endParaRPr lang="en-GB" sz="4400" b="0" strike="noStrike" spc="-1" dirty="0">
               <a:latin typeface="Arial"/>
             </a:endParaRPr>
           </a:p>
@@ -40006,7 +40020,7 @@
         </p:nvSpPr>
         <p:spPr>
           <a:xfrm>
-            <a:off x="457200" y="2034720"/>
+            <a:off x="480294" y="774091"/>
             <a:ext cx="8227800" cy="509400"/>
           </a:xfrm>
           <a:prstGeom prst="rect">
@@ -40049,7 +40063,7 @@
               <a:buChar char="•"/>
             </a:pPr>
             <a:r>
-              <a:rPr lang="en-GB" sz="2180" b="0" strike="noStrike" spc="-1">
+              <a:rPr lang="en-GB" sz="2180" b="0" strike="noStrike" spc="-1" dirty="0">
                 <a:solidFill>
                   <a:srgbClr val="000000"/>
                 </a:solidFill>
@@ -40058,7 +40072,7 @@
               </a:rPr>
               <a:t>Keep/remove data that satisfies one or more conditions</a:t>
             </a:r>
-            <a:endParaRPr lang="en-GB" sz="2180" b="0" strike="noStrike" spc="-1">
+            <a:endParaRPr lang="en-GB" sz="2180" b="0" strike="noStrike" spc="-1" dirty="0">
               <a:latin typeface="Arial"/>
             </a:endParaRPr>
           </a:p>
@@ -40074,7 +40088,7 @@
                 <a:tab pos="0" algn="l"/>
               </a:tabLst>
             </a:pPr>
-            <a:endParaRPr lang="en-GB" sz="2180" b="0" strike="noStrike" spc="-1">
+            <a:endParaRPr lang="en-GB" sz="2180" b="0" strike="noStrike" spc="-1" dirty="0">
               <a:latin typeface="Arial"/>
             </a:endParaRPr>
           </a:p>
@@ -40087,7 +40101,7 @@
                 <a:tab pos="0" algn="l"/>
               </a:tabLst>
             </a:pPr>
-            <a:endParaRPr lang="en-GB" sz="2180" b="0" strike="noStrike" spc="-1">
+            <a:endParaRPr lang="en-GB" sz="2180" b="0" strike="noStrike" spc="-1" dirty="0">
               <a:latin typeface="Arial"/>
             </a:endParaRPr>
           </a:p>
@@ -40103,7 +40117,7 @@
                 <a:tab pos="0" algn="l"/>
               </a:tabLst>
             </a:pPr>
-            <a:endParaRPr lang="en-GB" sz="2180" b="0" strike="noStrike" spc="-1">
+            <a:endParaRPr lang="en-GB" sz="2180" b="0" strike="noStrike" spc="-1" dirty="0">
               <a:latin typeface="Arial"/>
             </a:endParaRPr>
           </a:p>
@@ -40117,8 +40131,8 @@
         </p:nvSpPr>
         <p:spPr>
           <a:xfrm>
-            <a:off x="763560" y="2690280"/>
-            <a:ext cx="4705200" cy="1461240"/>
+            <a:off x="715520" y="1150823"/>
+            <a:ext cx="7711158" cy="4184307"/>
           </a:xfrm>
           <a:prstGeom prst="rect">
             <a:avLst/>
@@ -40141,7 +40155,7 @@
           <a:fontRef idx="minor"/>
         </p:style>
         <p:txBody>
-          <a:bodyPr lIns="90000" tIns="45000" rIns="90000" bIns="45000">
+          <a:bodyPr wrap="square" lIns="90000" tIns="45000" rIns="90000" bIns="45000">
             <a:spAutoFit/>
           </a:bodyPr>
           <a:lstStyle/>
@@ -40152,7 +40166,7 @@
               </a:lnSpc>
             </a:pPr>
             <a:r>
-              <a:rPr lang="en-GB" sz="1800" b="1" u="sng" strike="noStrike" spc="-1">
+              <a:rPr lang="en-GB" sz="1400" strike="noStrike" spc="-1" dirty="0">
                 <a:solidFill>
                   <a:srgbClr val="000000"/>
                 </a:solidFill>
@@ -40160,20 +40174,10 @@
                 <a:latin typeface="Courier New"/>
                 <a:ea typeface="DejaVu Sans"/>
               </a:rPr>
-              <a:t>&gt; my_vec = c(1, 2, 3, 4, 5, 6)</a:t>
+              <a:t>&gt; # Puromycin is a built-in </a:t>
             </a:r>
-            <a:endParaRPr lang="en-GB" sz="1800" b="0" strike="noStrike" spc="-1">
-              <a:latin typeface="Arial"/>
-            </a:endParaRPr>
-          </a:p>
-          <a:p>
-            <a:pPr>
-              <a:lnSpc>
-                <a:spcPct val="100000"/>
-              </a:lnSpc>
-            </a:pPr>
             <a:r>
-              <a:rPr lang="en-GB" sz="1800" b="1" u="sng" strike="noStrike" spc="-1">
+              <a:rPr lang="en-GB" sz="1400" strike="noStrike" spc="-1" dirty="0" err="1">
                 <a:solidFill>
                   <a:srgbClr val="000000"/>
                 </a:solidFill>
@@ -40181,11 +40185,19 @@
                 <a:latin typeface="Courier New"/>
                 <a:ea typeface="DejaVu Sans"/>
               </a:rPr>
-              <a:t>&gt; my_vec &lt; 4</a:t>
+              <a:t>data.frame</a:t>
             </a:r>
-            <a:endParaRPr lang="en-GB" sz="1800" b="0" strike="noStrike" spc="-1">
-              <a:latin typeface="Arial"/>
-            </a:endParaRPr>
+            <a:r>
+              <a:rPr lang="en-GB" sz="1400" strike="noStrike" spc="-1" dirty="0">
+                <a:solidFill>
+                  <a:srgbClr val="000000"/>
+                </a:solidFill>
+                <a:uFillTx/>
+                <a:latin typeface="Courier New"/>
+                <a:ea typeface="DejaVu Sans"/>
+              </a:rPr>
+              <a:t> that is pre-loaded in R</a:t>
+            </a:r>
           </a:p>
           <a:p>
             <a:pPr>
@@ -40194,7 +40206,25 @@
               </a:lnSpc>
             </a:pPr>
             <a:r>
-              <a:rPr lang="en-GB" sz="1800" b="1" u="sng" strike="noStrike" spc="-1">
+              <a:rPr lang="en-GB" sz="1400" strike="noStrike" spc="-1" dirty="0">
+                <a:solidFill>
+                  <a:srgbClr val="000000"/>
+                </a:solidFill>
+                <a:uFillTx/>
+                <a:latin typeface="Courier New"/>
+                <a:ea typeface="DejaVu Sans"/>
+              </a:rPr>
+              <a:t>&gt; head(Puromycin)</a:t>
+            </a:r>
+          </a:p>
+          <a:p>
+            <a:pPr>
+              <a:lnSpc>
+                <a:spcPct val="100000"/>
+              </a:lnSpc>
+            </a:pPr>
+            <a:r>
+              <a:rPr lang="en-GB" sz="1400" strike="noStrike" spc="-1" dirty="0">
                 <a:solidFill>
                   <a:srgbClr val="0070C0"/>
                 </a:solidFill>
@@ -40202,11 +40232,30 @@
                 <a:latin typeface="Courier New"/>
                 <a:ea typeface="DejaVu Sans"/>
               </a:rPr>
-              <a:t>TRUE TRUE TRUE FALSE FALSE FALSE</a:t>
+              <a:t>  </a:t>
             </a:r>
-            <a:endParaRPr lang="en-GB" sz="1800" b="0" strike="noStrike" spc="-1">
-              <a:latin typeface="Arial"/>
-            </a:endParaRPr>
+            <a:r>
+              <a:rPr lang="en-GB" sz="1400" strike="noStrike" spc="-1" dirty="0" err="1">
+                <a:solidFill>
+                  <a:srgbClr val="0070C0"/>
+                </a:solidFill>
+                <a:uFillTx/>
+                <a:latin typeface="Courier New"/>
+                <a:ea typeface="DejaVu Sans"/>
+              </a:rPr>
+              <a:t>conc</a:t>
+            </a:r>
+            <a:r>
+              <a:rPr lang="en-GB" sz="1400" strike="noStrike" spc="-1" dirty="0">
+                <a:solidFill>
+                  <a:srgbClr val="0070C0"/>
+                </a:solidFill>
+                <a:uFillTx/>
+                <a:latin typeface="Courier New"/>
+                <a:ea typeface="DejaVu Sans"/>
+              </a:rPr>
+              <a:t> rate   state</a:t>
+            </a:r>
           </a:p>
           <a:p>
             <a:pPr>
@@ -40215,7 +40264,115 @@
               </a:lnSpc>
             </a:pPr>
             <a:r>
-              <a:rPr lang="en-GB" sz="1800" b="1" u="sng" strike="noStrike" spc="-1">
+              <a:rPr lang="en-GB" sz="1400" strike="noStrike" spc="-1" dirty="0">
+                <a:solidFill>
+                  <a:srgbClr val="0070C0"/>
+                </a:solidFill>
+                <a:uFillTx/>
+                <a:latin typeface="Courier New"/>
+                <a:ea typeface="DejaVu Sans"/>
+              </a:rPr>
+              <a:t>1 0.02   76 treated</a:t>
+            </a:r>
+          </a:p>
+          <a:p>
+            <a:pPr>
+              <a:lnSpc>
+                <a:spcPct val="100000"/>
+              </a:lnSpc>
+            </a:pPr>
+            <a:r>
+              <a:rPr lang="en-GB" sz="1400" strike="noStrike" spc="-1" dirty="0">
+                <a:solidFill>
+                  <a:srgbClr val="0070C0"/>
+                </a:solidFill>
+                <a:uFillTx/>
+                <a:latin typeface="Courier New"/>
+                <a:ea typeface="DejaVu Sans"/>
+              </a:rPr>
+              <a:t>2 0.02   47 treated</a:t>
+            </a:r>
+          </a:p>
+          <a:p>
+            <a:pPr>
+              <a:lnSpc>
+                <a:spcPct val="100000"/>
+              </a:lnSpc>
+            </a:pPr>
+            <a:r>
+              <a:rPr lang="en-GB" sz="1400" strike="noStrike" spc="-1" dirty="0">
+                <a:solidFill>
+                  <a:srgbClr val="0070C0"/>
+                </a:solidFill>
+                <a:uFillTx/>
+                <a:latin typeface="Courier New"/>
+                <a:ea typeface="DejaVu Sans"/>
+              </a:rPr>
+              <a:t>3 0.06   97 treated</a:t>
+            </a:r>
+          </a:p>
+          <a:p>
+            <a:pPr>
+              <a:lnSpc>
+                <a:spcPct val="100000"/>
+              </a:lnSpc>
+            </a:pPr>
+            <a:r>
+              <a:rPr lang="en-GB" sz="1400" strike="noStrike" spc="-1" dirty="0">
+                <a:solidFill>
+                  <a:srgbClr val="0070C0"/>
+                </a:solidFill>
+                <a:uFillTx/>
+                <a:latin typeface="Courier New"/>
+                <a:ea typeface="DejaVu Sans"/>
+              </a:rPr>
+              <a:t>4 0.06  107 treated</a:t>
+            </a:r>
+          </a:p>
+          <a:p>
+            <a:pPr>
+              <a:lnSpc>
+                <a:spcPct val="100000"/>
+              </a:lnSpc>
+            </a:pPr>
+            <a:r>
+              <a:rPr lang="en-GB" sz="1400" strike="noStrike" spc="-1" dirty="0">
+                <a:solidFill>
+                  <a:srgbClr val="0070C0"/>
+                </a:solidFill>
+                <a:uFillTx/>
+                <a:latin typeface="Courier New"/>
+                <a:ea typeface="DejaVu Sans"/>
+              </a:rPr>
+              <a:t>5 0.11  123 treated</a:t>
+            </a:r>
+          </a:p>
+          <a:p>
+            <a:pPr>
+              <a:lnSpc>
+                <a:spcPct val="100000"/>
+              </a:lnSpc>
+            </a:pPr>
+            <a:r>
+              <a:rPr lang="en-GB" sz="1400" strike="noStrike" spc="-1" dirty="0">
+                <a:solidFill>
+                  <a:srgbClr val="0070C0"/>
+                </a:solidFill>
+                <a:uFillTx/>
+                <a:latin typeface="Courier New"/>
+                <a:ea typeface="DejaVu Sans"/>
+              </a:rPr>
+              <a:t>6 0.11  139 treated</a:t>
+            </a:r>
+          </a:p>
+          <a:p>
+            <a:pPr>
+              <a:lnSpc>
+                <a:spcPct val="100000"/>
+              </a:lnSpc>
+            </a:pPr>
+            <a:r>
+              <a:rPr lang="da-DK" sz="1400" strike="noStrike" spc="-1" dirty="0">
                 <a:solidFill>
                   <a:srgbClr val="000000"/>
                 </a:solidFill>
@@ -40223,11 +40380,8 @@
                 <a:latin typeface="Courier New"/>
                 <a:ea typeface="DejaVu Sans"/>
               </a:rPr>
-              <a:t>&gt; my_vec[my_vec &lt; 4]</a:t>
+              <a:t>&gt; Puromycin$conc &lt; 0.03</a:t>
             </a:r>
-            <a:endParaRPr lang="en-GB" sz="1800" b="0" strike="noStrike" spc="-1">
-              <a:latin typeface="Arial"/>
-            </a:endParaRPr>
           </a:p>
           <a:p>
             <a:pPr>
@@ -40236,7 +40390,7 @@
               </a:lnSpc>
             </a:pPr>
             <a:r>
-              <a:rPr lang="en-GB" sz="1800" b="1" u="sng" strike="noStrike" spc="-1">
+              <a:rPr lang="da-DK" sz="1400" strike="noStrike" spc="-1" dirty="0">
                 <a:solidFill>
                   <a:srgbClr val="0070C0"/>
                 </a:solidFill>
@@ -40244,9 +40398,206 @@
                 <a:latin typeface="Courier New"/>
                 <a:ea typeface="DejaVu Sans"/>
               </a:rPr>
-              <a:t>1 2 3</a:t>
+              <a:t>[1]  TRUE  TRUE FALSE FALSE FALSE FALSE FALSE FALSE FALSE FALSE FALSE</a:t>
             </a:r>
-            <a:endParaRPr lang="en-GB" sz="1800" b="0" strike="noStrike" spc="-1">
+          </a:p>
+          <a:p>
+            <a:pPr>
+              <a:lnSpc>
+                <a:spcPct val="100000"/>
+              </a:lnSpc>
+            </a:pPr>
+            <a:r>
+              <a:rPr lang="da-DK" sz="1400" strike="noStrike" spc="-1" dirty="0">
+                <a:solidFill>
+                  <a:srgbClr val="0070C0"/>
+                </a:solidFill>
+                <a:uFillTx/>
+                <a:latin typeface="Courier New"/>
+                <a:ea typeface="DejaVu Sans"/>
+              </a:rPr>
+              <a:t>[12] FALSE  TRUE  TRUE FALSE FALSE FALSE FALSE FALSE FALSE FALSE FALSE</a:t>
+            </a:r>
+          </a:p>
+          <a:p>
+            <a:pPr>
+              <a:lnSpc>
+                <a:spcPct val="100000"/>
+              </a:lnSpc>
+            </a:pPr>
+            <a:r>
+              <a:rPr lang="da-DK" sz="1400" strike="noStrike" spc="-1" dirty="0">
+                <a:solidFill>
+                  <a:srgbClr val="0070C0"/>
+                </a:solidFill>
+                <a:uFillTx/>
+                <a:latin typeface="Courier New"/>
+                <a:ea typeface="DejaVu Sans"/>
+              </a:rPr>
+              <a:t>[23] FALSE</a:t>
+            </a:r>
+            <a:endParaRPr lang="en-GB" sz="1400" strike="noStrike" spc="-1" dirty="0">
+              <a:solidFill>
+                <a:srgbClr val="0070C0"/>
+              </a:solidFill>
+              <a:latin typeface="Arial"/>
+            </a:endParaRPr>
+          </a:p>
+          <a:p>
+            <a:pPr>
+              <a:lnSpc>
+                <a:spcPct val="100000"/>
+              </a:lnSpc>
+            </a:pPr>
+            <a:r>
+              <a:rPr lang="en-GB" sz="1400" strike="noStrike" spc="-1" dirty="0">
+                <a:solidFill>
+                  <a:srgbClr val="000000"/>
+                </a:solidFill>
+                <a:uFillTx/>
+                <a:latin typeface="Courier New"/>
+                <a:ea typeface="DejaVu Sans"/>
+              </a:rPr>
+              <a:t>&gt; Puromycin[</a:t>
+            </a:r>
+            <a:r>
+              <a:rPr lang="en-GB" sz="1400" strike="noStrike" spc="-1" dirty="0" err="1">
+                <a:solidFill>
+                  <a:srgbClr val="000000"/>
+                </a:solidFill>
+                <a:uFillTx/>
+                <a:latin typeface="Courier New"/>
+                <a:ea typeface="DejaVu Sans"/>
+              </a:rPr>
+              <a:t>Puromycin$conc</a:t>
+            </a:r>
+            <a:r>
+              <a:rPr lang="en-GB" sz="1400" strike="noStrike" spc="-1" dirty="0">
+                <a:solidFill>
+                  <a:srgbClr val="000000"/>
+                </a:solidFill>
+                <a:uFillTx/>
+                <a:latin typeface="Courier New"/>
+                <a:ea typeface="DejaVu Sans"/>
+              </a:rPr>
+              <a:t>&lt; 0.03, ]</a:t>
+            </a:r>
+          </a:p>
+          <a:p>
+            <a:pPr>
+              <a:lnSpc>
+                <a:spcPct val="100000"/>
+              </a:lnSpc>
+            </a:pPr>
+            <a:r>
+              <a:rPr lang="en-GB" sz="1400" strike="noStrike" spc="-1" dirty="0">
+                <a:solidFill>
+                  <a:srgbClr val="0070C0"/>
+                </a:solidFill>
+                <a:uFillTx/>
+                <a:latin typeface="Courier New"/>
+                <a:ea typeface="DejaVu Sans"/>
+              </a:rPr>
+              <a:t>   </a:t>
+            </a:r>
+            <a:r>
+              <a:rPr lang="en-GB" sz="1400" strike="noStrike" spc="-1" dirty="0" err="1">
+                <a:solidFill>
+                  <a:srgbClr val="0070C0"/>
+                </a:solidFill>
+                <a:uFillTx/>
+                <a:latin typeface="Courier New"/>
+                <a:ea typeface="DejaVu Sans"/>
+              </a:rPr>
+              <a:t>conc</a:t>
+            </a:r>
+            <a:r>
+              <a:rPr lang="en-GB" sz="1400" strike="noStrike" spc="-1" dirty="0">
+                <a:solidFill>
+                  <a:srgbClr val="0070C0"/>
+                </a:solidFill>
+                <a:uFillTx/>
+                <a:latin typeface="Courier New"/>
+                <a:ea typeface="DejaVu Sans"/>
+              </a:rPr>
+              <a:t> rate     state</a:t>
+            </a:r>
+          </a:p>
+          <a:p>
+            <a:pPr>
+              <a:lnSpc>
+                <a:spcPct val="100000"/>
+              </a:lnSpc>
+            </a:pPr>
+            <a:r>
+              <a:rPr lang="en-GB" sz="1400" strike="noStrike" spc="-1" dirty="0">
+                <a:solidFill>
+                  <a:srgbClr val="0070C0"/>
+                </a:solidFill>
+                <a:uFillTx/>
+                <a:latin typeface="Courier New"/>
+                <a:ea typeface="DejaVu Sans"/>
+              </a:rPr>
+              <a:t>1  0.02   76   treated</a:t>
+            </a:r>
+          </a:p>
+          <a:p>
+            <a:pPr>
+              <a:lnSpc>
+                <a:spcPct val="100000"/>
+              </a:lnSpc>
+            </a:pPr>
+            <a:r>
+              <a:rPr lang="en-GB" sz="1400" strike="noStrike" spc="-1" dirty="0">
+                <a:solidFill>
+                  <a:srgbClr val="0070C0"/>
+                </a:solidFill>
+                <a:uFillTx/>
+                <a:latin typeface="Courier New"/>
+                <a:ea typeface="DejaVu Sans"/>
+              </a:rPr>
+              <a:t>2  0.02   47   treated</a:t>
+            </a:r>
+          </a:p>
+          <a:p>
+            <a:pPr>
+              <a:lnSpc>
+                <a:spcPct val="100000"/>
+              </a:lnSpc>
+            </a:pPr>
+            <a:r>
+              <a:rPr lang="en-GB" sz="1400" strike="noStrike" spc="-1" dirty="0">
+                <a:solidFill>
+                  <a:srgbClr val="0070C0"/>
+                </a:solidFill>
+                <a:uFillTx/>
+                <a:latin typeface="Courier New"/>
+                <a:ea typeface="DejaVu Sans"/>
+              </a:rPr>
+              <a:t>13 0.02   67 untreated</a:t>
+            </a:r>
+          </a:p>
+          <a:p>
+            <a:pPr>
+              <a:lnSpc>
+                <a:spcPct val="100000"/>
+              </a:lnSpc>
+            </a:pPr>
+            <a:r>
+              <a:rPr lang="en-GB" sz="1400" strike="noStrike" spc="-1" dirty="0">
+                <a:solidFill>
+                  <a:srgbClr val="0070C0"/>
+                </a:solidFill>
+                <a:uFillTx/>
+                <a:latin typeface="Courier New"/>
+                <a:ea typeface="DejaVu Sans"/>
+              </a:rPr>
+              <a:t>14 0.02   51 untreated</a:t>
+            </a:r>
+            <a:endParaRPr lang="en-GB" sz="1400" strike="noStrike" spc="-1" dirty="0">
+              <a:solidFill>
+                <a:srgbClr val="0070C0"/>
+              </a:solidFill>
               <a:latin typeface="Arial"/>
             </a:endParaRPr>
           </a:p>
@@ -40260,7 +40611,7 @@
         </p:nvSpPr>
         <p:spPr>
           <a:xfrm>
-            <a:off x="457200" y="4313520"/>
+            <a:off x="457199" y="5415029"/>
             <a:ext cx="8227800" cy="1072800"/>
           </a:xfrm>
           <a:prstGeom prst="rect">
@@ -40303,7 +40654,7 @@
               <a:buChar char="•"/>
             </a:pPr>
             <a:r>
-              <a:rPr lang="en-GB" sz="2180" b="0" strike="noStrike" spc="-1">
+              <a:rPr lang="en-GB" sz="2180" b="0" strike="noStrike" spc="-1" dirty="0">
                 <a:solidFill>
                   <a:srgbClr val="000000"/>
                 </a:solidFill>
@@ -40312,7 +40663,7 @@
               </a:rPr>
               <a:t>For more than one condition, we need to use logical operators</a:t>
             </a:r>
-            <a:endParaRPr lang="en-GB" sz="2180" b="0" strike="noStrike" spc="-1">
+            <a:endParaRPr lang="en-GB" sz="2180" b="0" strike="noStrike" spc="-1" dirty="0">
               <a:latin typeface="Arial"/>
             </a:endParaRPr>
           </a:p>
@@ -40331,7 +40682,7 @@
               <a:buChar char="–"/>
             </a:pPr>
             <a:r>
-              <a:rPr lang="en-GB" sz="1779" b="0" strike="noStrike" spc="-1">
+              <a:rPr lang="en-GB" sz="1779" b="0" strike="noStrike" spc="-1" dirty="0">
                 <a:solidFill>
                   <a:srgbClr val="000000"/>
                 </a:solidFill>
@@ -40340,7 +40691,7 @@
               </a:rPr>
               <a:t>&amp; (AND)</a:t>
             </a:r>
-            <a:endParaRPr lang="en-GB" sz="1779" b="0" strike="noStrike" spc="-1">
+            <a:endParaRPr lang="en-GB" sz="1779" b="0" strike="noStrike" spc="-1" dirty="0">
               <a:latin typeface="Arial"/>
             </a:endParaRPr>
           </a:p>
@@ -40359,7 +40710,7 @@
               <a:buChar char="–"/>
             </a:pPr>
             <a:r>
-              <a:rPr lang="en-GB" sz="1779" b="0" strike="noStrike" spc="-1">
+              <a:rPr lang="en-GB" sz="1779" b="0" strike="noStrike" spc="-1" dirty="0">
                 <a:solidFill>
                   <a:srgbClr val="000000"/>
                 </a:solidFill>
@@ -40368,7 +40719,7 @@
               </a:rPr>
               <a:t>| (OR)</a:t>
             </a:r>
-            <a:endParaRPr lang="en-GB" sz="1779" b="0" strike="noStrike" spc="-1">
+            <a:endParaRPr lang="en-GB" sz="1779" b="0" strike="noStrike" spc="-1" dirty="0">
               <a:latin typeface="Arial"/>
             </a:endParaRPr>
           </a:p>
@@ -40384,7 +40735,7 @@
                 <a:tab pos="0" algn="l"/>
               </a:tabLst>
             </a:pPr>
-            <a:endParaRPr lang="en-GB" sz="1779" b="0" strike="noStrike" spc="-1">
+            <a:endParaRPr lang="en-GB" sz="1779" b="0" strike="noStrike" spc="-1" dirty="0">
               <a:latin typeface="Arial"/>
             </a:endParaRPr>
           </a:p>
@@ -40400,7 +40751,7 @@
                 <a:tab pos="0" algn="l"/>
               </a:tabLst>
             </a:pPr>
-            <a:endParaRPr lang="en-GB" sz="1779" b="0" strike="noStrike" spc="-1">
+            <a:endParaRPr lang="en-GB" sz="1779" b="0" strike="noStrike" spc="-1" dirty="0">
               <a:latin typeface="Arial"/>
             </a:endParaRPr>
           </a:p>
@@ -40416,7 +40767,7 @@
                 <a:tab pos="0" algn="l"/>
               </a:tabLst>
             </a:pPr>
-            <a:endParaRPr lang="en-GB" sz="1779" b="0" strike="noStrike" spc="-1">
+            <a:endParaRPr lang="en-GB" sz="1779" b="0" strike="noStrike" spc="-1" dirty="0">
               <a:latin typeface="Arial"/>
             </a:endParaRPr>
           </a:p>
@@ -40834,722 +41185,6 @@
       </p:grpSpPr>
       <p:sp>
         <p:nvSpPr>
-          <p:cNvPr id="558" name="CustomShape 1"/>
-          <p:cNvSpPr/>
-          <p:nvPr/>
-        </p:nvSpPr>
-        <p:spPr>
-          <a:xfrm>
-            <a:off x="474120" y="582480"/>
-            <a:ext cx="8227800" cy="1143720"/>
-          </a:xfrm>
-          <a:prstGeom prst="rect">
-            <a:avLst/>
-          </a:prstGeom>
-          <a:noFill/>
-          <a:ln>
-            <a:noFill/>
-          </a:ln>
-        </p:spPr>
-        <p:style>
-          <a:lnRef idx="0">
-            <a:scrgbClr r="0" g="0" b="0"/>
-          </a:lnRef>
-          <a:fillRef idx="0">
-            <a:scrgbClr r="0" g="0" b="0"/>
-          </a:fillRef>
-          <a:effectRef idx="0">
-            <a:scrgbClr r="0" g="0" b="0"/>
-          </a:effectRef>
-          <a:fontRef idx="minor"/>
-        </p:style>
-        <p:txBody>
-          <a:bodyPr lIns="0" tIns="0" rIns="0" bIns="0" anchor="ctr">
-            <a:noAutofit/>
-          </a:bodyPr>
-          <a:lstStyle/>
-          <a:p>
-            <a:pPr algn="ctr">
-              <a:lnSpc>
-                <a:spcPct val="100000"/>
-              </a:lnSpc>
-            </a:pPr>
-            <a:r>
-              <a:rPr lang="en-GB" sz="4400" b="1" strike="noStrike" spc="-1">
-                <a:solidFill>
-                  <a:srgbClr val="000000"/>
-                </a:solidFill>
-                <a:latin typeface="Calibri"/>
-                <a:ea typeface="DejaVu Sans"/>
-              </a:rPr>
-              <a:t>Logical operators</a:t>
-            </a:r>
-            <a:br/>
-            <a:r>
-              <a:rPr lang="en-GB" sz="3200" b="1" strike="noStrike" spc="-1">
-                <a:solidFill>
-                  <a:srgbClr val="000000"/>
-                </a:solidFill>
-                <a:latin typeface="Calibri"/>
-                <a:ea typeface="DejaVu Sans"/>
-              </a:rPr>
-              <a:t>(Boolean operations)</a:t>
-            </a:r>
-            <a:endParaRPr lang="en-GB" sz="3200" b="0" strike="noStrike" spc="-1">
-              <a:latin typeface="Arial"/>
-            </a:endParaRPr>
-          </a:p>
-        </p:txBody>
-      </p:sp>
-      <p:sp>
-        <p:nvSpPr>
-          <p:cNvPr id="559" name="CustomShape 2"/>
-          <p:cNvSpPr/>
-          <p:nvPr/>
-        </p:nvSpPr>
-        <p:spPr>
-          <a:xfrm>
-            <a:off x="812880" y="1826640"/>
-            <a:ext cx="5451480" cy="1461240"/>
-          </a:xfrm>
-          <a:prstGeom prst="rect">
-            <a:avLst/>
-          </a:prstGeom>
-          <a:noFill/>
-          <a:ln>
-            <a:noFill/>
-          </a:ln>
-        </p:spPr>
-        <p:style>
-          <a:lnRef idx="0">
-            <a:scrgbClr r="0" g="0" b="0"/>
-          </a:lnRef>
-          <a:fillRef idx="0">
-            <a:scrgbClr r="0" g="0" b="0"/>
-          </a:fillRef>
-          <a:effectRef idx="0">
-            <a:scrgbClr r="0" g="0" b="0"/>
-          </a:effectRef>
-          <a:fontRef idx="minor"/>
-        </p:style>
-        <p:txBody>
-          <a:bodyPr lIns="90000" tIns="45000" rIns="90000" bIns="45000">
-            <a:spAutoFit/>
-          </a:bodyPr>
-          <a:lstStyle/>
-          <a:p>
-            <a:pPr>
-              <a:lnSpc>
-                <a:spcPct val="100000"/>
-              </a:lnSpc>
-            </a:pPr>
-            <a:r>
-              <a:rPr lang="en-US" sz="1800" b="0" strike="noStrike" spc="-1">
-                <a:solidFill>
-                  <a:srgbClr val="000000"/>
-                </a:solidFill>
-                <a:latin typeface="Courier New"/>
-                <a:ea typeface="DejaVu Sans"/>
-              </a:rPr>
-              <a:t>!x</a:t>
-            </a:r>
-            <a:r>
-              <a:rPr lang="en-US" sz="1800" b="0" strike="noStrike" spc="-1">
-                <a:solidFill>
-                  <a:srgbClr val="000000"/>
-                </a:solidFill>
-                <a:latin typeface="Calibri"/>
-                <a:ea typeface="DejaVu Sans"/>
-              </a:rPr>
-              <a:t>		Logical NOT	</a:t>
-            </a:r>
-            <a:endParaRPr lang="en-GB" sz="1800" b="0" strike="noStrike" spc="-1">
-              <a:latin typeface="Arial"/>
-            </a:endParaRPr>
-          </a:p>
-          <a:p>
-            <a:pPr>
-              <a:lnSpc>
-                <a:spcPct val="100000"/>
-              </a:lnSpc>
-            </a:pPr>
-            <a:r>
-              <a:rPr lang="en-US" sz="1800" b="0" strike="noStrike" spc="-1">
-                <a:solidFill>
-                  <a:srgbClr val="000000"/>
-                </a:solidFill>
-                <a:latin typeface="Courier New"/>
-                <a:ea typeface="DejaVu Sans"/>
-              </a:rPr>
-              <a:t>x&amp;y	</a:t>
-            </a:r>
-            <a:r>
-              <a:rPr lang="en-US" sz="1800" b="0" strike="noStrike" spc="-1">
-                <a:solidFill>
-                  <a:srgbClr val="000000"/>
-                </a:solidFill>
-                <a:latin typeface="Calibri"/>
-                <a:ea typeface="DejaVu Sans"/>
-              </a:rPr>
-              <a:t>	Element-wise logical AND	</a:t>
-            </a:r>
-            <a:endParaRPr lang="en-GB" sz="1800" b="0" strike="noStrike" spc="-1">
-              <a:latin typeface="Arial"/>
-            </a:endParaRPr>
-          </a:p>
-          <a:p>
-            <a:pPr>
-              <a:lnSpc>
-                <a:spcPct val="100000"/>
-              </a:lnSpc>
-            </a:pPr>
-            <a:r>
-              <a:rPr lang="en-US" sz="1800" b="0" strike="noStrike" spc="-1">
-                <a:solidFill>
-                  <a:srgbClr val="000000"/>
-                </a:solidFill>
-                <a:latin typeface="Courier New"/>
-                <a:ea typeface="DejaVu Sans"/>
-              </a:rPr>
-              <a:t>x&amp;&amp;y</a:t>
-            </a:r>
-            <a:r>
-              <a:rPr lang="en-US" sz="1800" b="0" strike="noStrike" spc="-1">
-                <a:solidFill>
-                  <a:srgbClr val="000000"/>
-                </a:solidFill>
-                <a:latin typeface="Calibri"/>
-                <a:ea typeface="DejaVu Sans"/>
-              </a:rPr>
-              <a:t>	Logical AND	</a:t>
-            </a:r>
-            <a:endParaRPr lang="en-GB" sz="1800" b="0" strike="noStrike" spc="-1">
-              <a:latin typeface="Arial"/>
-            </a:endParaRPr>
-          </a:p>
-          <a:p>
-            <a:pPr>
-              <a:lnSpc>
-                <a:spcPct val="100000"/>
-              </a:lnSpc>
-            </a:pPr>
-            <a:r>
-              <a:rPr lang="en-US" sz="1800" b="0" strike="noStrike" spc="-1">
-                <a:solidFill>
-                  <a:srgbClr val="000000"/>
-                </a:solidFill>
-                <a:latin typeface="Courier New"/>
-                <a:ea typeface="DejaVu Sans"/>
-              </a:rPr>
-              <a:t>x|y	</a:t>
-            </a:r>
-            <a:r>
-              <a:rPr lang="en-US" sz="1800" b="0" strike="noStrike" spc="-1">
-                <a:solidFill>
-                  <a:srgbClr val="000000"/>
-                </a:solidFill>
-                <a:latin typeface="Calibri"/>
-                <a:ea typeface="DejaVu Sans"/>
-              </a:rPr>
-              <a:t>	Element-wise logical OR	</a:t>
-            </a:r>
-            <a:endParaRPr lang="en-GB" sz="1800" b="0" strike="noStrike" spc="-1">
-              <a:latin typeface="Arial"/>
-            </a:endParaRPr>
-          </a:p>
-          <a:p>
-            <a:pPr>
-              <a:lnSpc>
-                <a:spcPct val="100000"/>
-              </a:lnSpc>
-            </a:pPr>
-            <a:r>
-              <a:rPr lang="en-US" sz="1800" b="0" strike="noStrike" spc="-1">
-                <a:solidFill>
-                  <a:srgbClr val="000000"/>
-                </a:solidFill>
-                <a:latin typeface="Courier New"/>
-                <a:ea typeface="DejaVu Sans"/>
-              </a:rPr>
-              <a:t>x||y	</a:t>
-            </a:r>
-            <a:r>
-              <a:rPr lang="en-US" sz="1800" b="0" strike="noStrike" spc="-1">
-                <a:solidFill>
-                  <a:srgbClr val="000000"/>
-                </a:solidFill>
-                <a:latin typeface="Calibri"/>
-                <a:ea typeface="DejaVu Sans"/>
-              </a:rPr>
-              <a:t>Logical OR	</a:t>
-            </a:r>
-            <a:endParaRPr lang="en-GB" sz="1800" b="0" strike="noStrike" spc="-1">
-              <a:latin typeface="Arial"/>
-            </a:endParaRPr>
-          </a:p>
-        </p:txBody>
-      </p:sp>
-      <p:sp>
-        <p:nvSpPr>
-          <p:cNvPr id="560" name="CustomShape 3"/>
-          <p:cNvSpPr/>
-          <p:nvPr/>
-        </p:nvSpPr>
-        <p:spPr>
-          <a:xfrm>
-            <a:off x="1981080" y="3441600"/>
-            <a:ext cx="4570920" cy="3381480"/>
-          </a:xfrm>
-          <a:prstGeom prst="rect">
-            <a:avLst/>
-          </a:prstGeom>
-          <a:noFill/>
-          <a:ln>
-            <a:noFill/>
-          </a:ln>
-        </p:spPr>
-        <p:style>
-          <a:lnRef idx="0">
-            <a:scrgbClr r="0" g="0" b="0"/>
-          </a:lnRef>
-          <a:fillRef idx="0">
-            <a:scrgbClr r="0" g="0" b="0"/>
-          </a:fillRef>
-          <a:effectRef idx="0">
-            <a:scrgbClr r="0" g="0" b="0"/>
-          </a:effectRef>
-          <a:fontRef idx="minor"/>
-        </p:style>
-        <p:txBody>
-          <a:bodyPr lIns="90000" tIns="45000" rIns="90000" bIns="45000">
-            <a:spAutoFit/>
-          </a:bodyPr>
-          <a:lstStyle/>
-          <a:p>
-            <a:pPr>
-              <a:lnSpc>
-                <a:spcPct val="100000"/>
-              </a:lnSpc>
-            </a:pPr>
-            <a:r>
-              <a:rPr lang="en-GB" sz="1800" b="0" strike="noStrike" spc="-1">
-                <a:solidFill>
-                  <a:srgbClr val="000000"/>
-                </a:solidFill>
-                <a:latin typeface="Courier New"/>
-                <a:ea typeface="DejaVu Sans"/>
-              </a:rPr>
-              <a:t>x &lt;- c(TRUE, FALSE, 0, 6)</a:t>
-            </a:r>
-            <a:endParaRPr lang="en-GB" sz="1800" b="0" strike="noStrike" spc="-1">
-              <a:latin typeface="Arial"/>
-            </a:endParaRPr>
-          </a:p>
-          <a:p>
-            <a:pPr>
-              <a:lnSpc>
-                <a:spcPct val="100000"/>
-              </a:lnSpc>
-            </a:pPr>
-            <a:r>
-              <a:rPr lang="en-US" sz="1800" b="0" strike="noStrike" spc="-1">
-                <a:solidFill>
-                  <a:srgbClr val="000000"/>
-                </a:solidFill>
-                <a:latin typeface="Courier New"/>
-                <a:ea typeface="DejaVu Sans"/>
-              </a:rPr>
-              <a:t>y &lt;- c(FALSE, TRUE, FALSE, TRUE)</a:t>
-            </a:r>
-            <a:endParaRPr lang="en-GB" sz="1800" b="0" strike="noStrike" spc="-1">
-              <a:latin typeface="Arial"/>
-            </a:endParaRPr>
-          </a:p>
-          <a:p>
-            <a:pPr>
-              <a:lnSpc>
-                <a:spcPct val="100000"/>
-              </a:lnSpc>
-            </a:pPr>
-            <a:r>
-              <a:rPr lang="en-US" sz="1800" b="0" strike="noStrike" spc="-1">
-                <a:solidFill>
-                  <a:srgbClr val="000000"/>
-                </a:solidFill>
-                <a:latin typeface="Courier New"/>
-                <a:ea typeface="DejaVu Sans"/>
-              </a:rPr>
-              <a:t>!x</a:t>
-            </a:r>
-            <a:endParaRPr lang="en-GB" sz="1800" b="0" strike="noStrike" spc="-1">
-              <a:latin typeface="Arial"/>
-            </a:endParaRPr>
-          </a:p>
-          <a:p>
-            <a:pPr>
-              <a:lnSpc>
-                <a:spcPct val="100000"/>
-              </a:lnSpc>
-            </a:pPr>
-            <a:r>
-              <a:rPr lang="en-US" sz="1800" b="0" strike="noStrike" spc="-1">
-                <a:solidFill>
-                  <a:srgbClr val="000000"/>
-                </a:solidFill>
-                <a:latin typeface="Courier New"/>
-                <a:ea typeface="DejaVu Sans"/>
-              </a:rPr>
-              <a:t>FALSE  TRUE  TRUE FALSE</a:t>
-            </a:r>
-            <a:endParaRPr lang="en-GB" sz="1800" b="0" strike="noStrike" spc="-1">
-              <a:latin typeface="Arial"/>
-            </a:endParaRPr>
-          </a:p>
-          <a:p>
-            <a:pPr>
-              <a:lnSpc>
-                <a:spcPct val="100000"/>
-              </a:lnSpc>
-            </a:pPr>
-            <a:r>
-              <a:rPr lang="en-US" sz="1800" b="0" strike="noStrike" spc="-1">
-                <a:solidFill>
-                  <a:srgbClr val="000000"/>
-                </a:solidFill>
-                <a:latin typeface="Courier New"/>
-                <a:ea typeface="DejaVu Sans"/>
-              </a:rPr>
-              <a:t>x&amp;y</a:t>
-            </a:r>
-            <a:endParaRPr lang="en-GB" sz="1800" b="0" strike="noStrike" spc="-1">
-              <a:latin typeface="Arial"/>
-            </a:endParaRPr>
-          </a:p>
-          <a:p>
-            <a:pPr>
-              <a:lnSpc>
-                <a:spcPct val="100000"/>
-              </a:lnSpc>
-            </a:pPr>
-            <a:r>
-              <a:rPr lang="en-US" sz="1800" b="0" strike="noStrike" spc="-1">
-                <a:solidFill>
-                  <a:srgbClr val="000000"/>
-                </a:solidFill>
-                <a:latin typeface="Courier New"/>
-                <a:ea typeface="DejaVu Sans"/>
-              </a:rPr>
-              <a:t>FALSE FALSE FALSE  TRUE</a:t>
-            </a:r>
-            <a:endParaRPr lang="en-GB" sz="1800" b="0" strike="noStrike" spc="-1">
-              <a:latin typeface="Arial"/>
-            </a:endParaRPr>
-          </a:p>
-          <a:p>
-            <a:pPr>
-              <a:lnSpc>
-                <a:spcPct val="100000"/>
-              </a:lnSpc>
-            </a:pPr>
-            <a:r>
-              <a:rPr lang="uk-UA" sz="1800" b="0" strike="noStrike" spc="-1">
-                <a:solidFill>
-                  <a:srgbClr val="000000"/>
-                </a:solidFill>
-                <a:latin typeface="Courier New"/>
-                <a:ea typeface="DejaVu Sans"/>
-              </a:rPr>
-              <a:t>x&amp;&amp;y</a:t>
-            </a:r>
-            <a:endParaRPr lang="en-GB" sz="1800" b="0" strike="noStrike" spc="-1">
-              <a:latin typeface="Arial"/>
-            </a:endParaRPr>
-          </a:p>
-          <a:p>
-            <a:pPr>
-              <a:lnSpc>
-                <a:spcPct val="100000"/>
-              </a:lnSpc>
-            </a:pPr>
-            <a:r>
-              <a:rPr lang="uk-UA" sz="1800" b="0" strike="noStrike" spc="-1">
-                <a:solidFill>
-                  <a:srgbClr val="000000"/>
-                </a:solidFill>
-                <a:latin typeface="Courier New"/>
-                <a:ea typeface="DejaVu Sans"/>
-              </a:rPr>
-              <a:t>FALSE</a:t>
-            </a:r>
-            <a:endParaRPr lang="en-GB" sz="1800" b="0" strike="noStrike" spc="-1">
-              <a:latin typeface="Arial"/>
-            </a:endParaRPr>
-          </a:p>
-          <a:p>
-            <a:pPr>
-              <a:lnSpc>
-                <a:spcPct val="100000"/>
-              </a:lnSpc>
-            </a:pPr>
-            <a:r>
-              <a:rPr lang="uk-UA" sz="1800" b="0" strike="noStrike" spc="-1">
-                <a:solidFill>
-                  <a:srgbClr val="000000"/>
-                </a:solidFill>
-                <a:latin typeface="Courier New"/>
-                <a:ea typeface="DejaVu Sans"/>
-              </a:rPr>
-              <a:t>x|y</a:t>
-            </a:r>
-            <a:endParaRPr lang="en-GB" sz="1800" b="0" strike="noStrike" spc="-1">
-              <a:latin typeface="Arial"/>
-            </a:endParaRPr>
-          </a:p>
-          <a:p>
-            <a:pPr>
-              <a:lnSpc>
-                <a:spcPct val="100000"/>
-              </a:lnSpc>
-            </a:pPr>
-            <a:r>
-              <a:rPr lang="en-US" sz="1800" b="0" strike="noStrike" spc="-1">
-                <a:solidFill>
-                  <a:srgbClr val="000000"/>
-                </a:solidFill>
-                <a:latin typeface="Courier New"/>
-                <a:ea typeface="DejaVu Sans"/>
-              </a:rPr>
-              <a:t>TRUE  TRUE FALSE  TRUE</a:t>
-            </a:r>
-            <a:endParaRPr lang="en-GB" sz="1800" b="0" strike="noStrike" spc="-1">
-              <a:latin typeface="Arial"/>
-            </a:endParaRPr>
-          </a:p>
-          <a:p>
-            <a:pPr>
-              <a:lnSpc>
-                <a:spcPct val="100000"/>
-              </a:lnSpc>
-            </a:pPr>
-            <a:r>
-              <a:rPr lang="en-US" sz="1800" b="0" strike="noStrike" spc="-1">
-                <a:solidFill>
-                  <a:srgbClr val="000000"/>
-                </a:solidFill>
-                <a:latin typeface="Courier New"/>
-                <a:ea typeface="DejaVu Sans"/>
-              </a:rPr>
-              <a:t>x||y</a:t>
-            </a:r>
-            <a:endParaRPr lang="en-GB" sz="1800" b="0" strike="noStrike" spc="-1">
-              <a:latin typeface="Arial"/>
-            </a:endParaRPr>
-          </a:p>
-          <a:p>
-            <a:pPr>
-              <a:lnSpc>
-                <a:spcPct val="100000"/>
-              </a:lnSpc>
-            </a:pPr>
-            <a:r>
-              <a:rPr lang="en-US" sz="1800" b="0" strike="noStrike" spc="-1">
-                <a:solidFill>
-                  <a:srgbClr val="000000"/>
-                </a:solidFill>
-                <a:latin typeface="Courier New"/>
-                <a:ea typeface="DejaVu Sans"/>
-              </a:rPr>
-              <a:t>TRUE</a:t>
-            </a:r>
-            <a:endParaRPr lang="en-GB" sz="1800" b="0" strike="noStrike" spc="-1">
-              <a:latin typeface="Arial"/>
-            </a:endParaRPr>
-          </a:p>
-        </p:txBody>
-      </p:sp>
-      <p:sp>
-        <p:nvSpPr>
-          <p:cNvPr id="561" name="CustomShape 4"/>
-          <p:cNvSpPr/>
-          <p:nvPr/>
-        </p:nvSpPr>
-        <p:spPr>
-          <a:xfrm>
-            <a:off x="4724280" y="2063160"/>
-            <a:ext cx="4249080" cy="912600"/>
-          </a:xfrm>
-          <a:prstGeom prst="rect">
-            <a:avLst/>
-          </a:prstGeom>
-          <a:noFill/>
-          <a:ln>
-            <a:noFill/>
-          </a:ln>
-        </p:spPr>
-        <p:style>
-          <a:lnRef idx="0">
-            <a:scrgbClr r="0" g="0" b="0"/>
-          </a:lnRef>
-          <a:fillRef idx="0">
-            <a:scrgbClr r="0" g="0" b="0"/>
-          </a:fillRef>
-          <a:effectRef idx="0">
-            <a:scrgbClr r="0" g="0" b="0"/>
-          </a:effectRef>
-          <a:fontRef idx="minor"/>
-        </p:style>
-        <p:txBody>
-          <a:bodyPr lIns="90000" tIns="45000" rIns="90000" bIns="45000">
-            <a:spAutoFit/>
-          </a:bodyPr>
-          <a:lstStyle/>
-          <a:p>
-            <a:pPr>
-              <a:lnSpc>
-                <a:spcPct val="100000"/>
-              </a:lnSpc>
-            </a:pPr>
-            <a:r>
-              <a:rPr lang="en-US" sz="1800" b="0" strike="noStrike" spc="-1">
-                <a:solidFill>
-                  <a:srgbClr val="FF0000"/>
-                </a:solidFill>
-                <a:latin typeface="Calibri"/>
-                <a:ea typeface="DejaVu Sans"/>
-              </a:rPr>
-              <a:t>Note: Zero is considered as FALSE,</a:t>
-            </a:r>
-            <a:endParaRPr lang="en-GB" sz="1800" b="0" strike="noStrike" spc="-1">
-              <a:latin typeface="Arial"/>
-            </a:endParaRPr>
-          </a:p>
-          <a:p>
-            <a:pPr>
-              <a:lnSpc>
-                <a:spcPct val="100000"/>
-              </a:lnSpc>
-            </a:pPr>
-            <a:r>
-              <a:rPr lang="en-US" sz="1800" b="0" strike="noStrike" spc="-1">
-                <a:solidFill>
-                  <a:srgbClr val="FF0000"/>
-                </a:solidFill>
-                <a:latin typeface="Calibri"/>
-                <a:ea typeface="DejaVu Sans"/>
-              </a:rPr>
-              <a:t>non-zero values are considered as TRUE!</a:t>
-            </a:r>
-            <a:endParaRPr lang="en-GB" sz="1800" b="0" strike="noStrike" spc="-1">
-              <a:latin typeface="Arial"/>
-            </a:endParaRPr>
-          </a:p>
-          <a:p>
-            <a:pPr>
-              <a:lnSpc>
-                <a:spcPct val="100000"/>
-              </a:lnSpc>
-            </a:pPr>
-            <a:r>
-              <a:rPr lang="en-US" sz="1800" b="0" strike="noStrike" spc="-1">
-                <a:solidFill>
-                  <a:srgbClr val="FF0000"/>
-                </a:solidFill>
-                <a:latin typeface="Calibri"/>
-                <a:ea typeface="DejaVu Sans"/>
-              </a:rPr>
-              <a:t>Only “numeric-like” or logical vectors!</a:t>
-            </a:r>
-            <a:endParaRPr lang="en-GB" sz="1800" b="0" strike="noStrike" spc="-1">
-              <a:latin typeface="Arial"/>
-            </a:endParaRPr>
-          </a:p>
-        </p:txBody>
-      </p:sp>
-    </p:spTree>
-  </p:cSld>
-  <p:clrMapOvr>
-    <a:masterClrMapping/>
-  </p:clrMapOvr>
-</p:sld>
-</file>
-
-<file path=ppt/slides/slide26.xml><?xml version="1.0" encoding="utf-8"?>
-<p:sld xmlns:a="http://schemas.openxmlformats.org/drawingml/2006/main" xmlns:r="http://schemas.openxmlformats.org/officeDocument/2006/relationships" xmlns:p="http://schemas.openxmlformats.org/presentationml/2006/main">
-  <p:cSld>
-    <p:spTree>
-      <p:nvGrpSpPr>
-        <p:cNvPr id="1" name=""/>
-        <p:cNvGrpSpPr/>
-        <p:nvPr/>
-      </p:nvGrpSpPr>
-      <p:grpSpPr>
-        <a:xfrm>
-          <a:off x="0" y="0"/>
-          <a:ext cx="0" cy="0"/>
-          <a:chOff x="0" y="0"/>
-          <a:chExt cx="0" cy="0"/>
-        </a:xfrm>
-      </p:grpSpPr>
-      <p:sp>
-        <p:nvSpPr>
-          <p:cNvPr id="562" name="CustomShape 1"/>
-          <p:cNvSpPr/>
-          <p:nvPr/>
-        </p:nvSpPr>
-        <p:spPr>
-          <a:xfrm>
-            <a:off x="457200" y="684000"/>
-            <a:ext cx="8227800" cy="1143720"/>
-          </a:xfrm>
-          <a:prstGeom prst="rect">
-            <a:avLst/>
-          </a:prstGeom>
-          <a:noFill/>
-          <a:ln>
-            <a:noFill/>
-          </a:ln>
-        </p:spPr>
-        <p:style>
-          <a:lnRef idx="0">
-            <a:scrgbClr r="0" g="0" b="0"/>
-          </a:lnRef>
-          <a:fillRef idx="0">
-            <a:scrgbClr r="0" g="0" b="0"/>
-          </a:fillRef>
-          <a:effectRef idx="0">
-            <a:scrgbClr r="0" g="0" b="0"/>
-          </a:effectRef>
-          <a:fontRef idx="minor"/>
-        </p:style>
-        <p:txBody>
-          <a:bodyPr lIns="0" tIns="0" rIns="0" bIns="0" anchor="ctr">
-            <a:noAutofit/>
-          </a:bodyPr>
-          <a:lstStyle/>
-          <a:p>
-            <a:pPr algn="ctr">
-              <a:lnSpc>
-                <a:spcPct val="100000"/>
-              </a:lnSpc>
-            </a:pPr>
-            <a:r>
-              <a:rPr lang="en-GB" sz="4400" b="1" strike="noStrike" spc="-1">
-                <a:solidFill>
-                  <a:srgbClr val="000000"/>
-                </a:solidFill>
-                <a:latin typeface="Calibri"/>
-                <a:ea typeface="DejaVu Sans"/>
-              </a:rPr>
-              <a:t>Logical operators (combine with previous)</a:t>
-            </a:r>
-            <a:endParaRPr lang="en-GB" sz="4400" b="0" strike="noStrike" spc="-1">
-              <a:latin typeface="Arial"/>
-            </a:endParaRPr>
-          </a:p>
-        </p:txBody>
-      </p:sp>
-      <p:sp>
-        <p:nvSpPr>
           <p:cNvPr id="563" name="CustomShape 2"/>
           <p:cNvSpPr/>
           <p:nvPr/>
@@ -41581,7 +41216,7 @@
         </p:style>
         <p:txBody>
           <a:bodyPr lIns="0" tIns="0" rIns="0" bIns="0">
-            <a:normAutofit/>
+            <a:normAutofit lnSpcReduction="10000"/>
           </a:bodyPr>
           <a:lstStyle/>
           <a:p>
@@ -41599,7 +41234,7 @@
               <a:buChar char="•"/>
             </a:pPr>
             <a:r>
-              <a:rPr lang="en-GB" sz="2180" b="0" strike="noStrike" spc="-1">
+              <a:rPr lang="en-GB" sz="2180" b="0" strike="noStrike" spc="-1" dirty="0">
                 <a:solidFill>
                   <a:srgbClr val="000000"/>
                 </a:solidFill>
@@ -41608,7 +41243,7 @@
               </a:rPr>
               <a:t>TRUE &amp; TRUE     # evaluates to TRUE</a:t>
             </a:r>
-            <a:endParaRPr lang="en-GB" sz="2180" b="0" strike="noStrike" spc="-1">
+            <a:endParaRPr lang="en-GB" sz="2180" b="0" strike="noStrike" spc="-1" dirty="0">
               <a:latin typeface="Arial"/>
             </a:endParaRPr>
           </a:p>
@@ -41627,7 +41262,7 @@
               <a:buChar char="•"/>
             </a:pPr>
             <a:r>
-              <a:rPr lang="en-GB" sz="2180" b="0" strike="noStrike" spc="-1">
+              <a:rPr lang="en-GB" sz="2180" b="0" strike="noStrike" spc="-1" dirty="0">
                 <a:solidFill>
                   <a:srgbClr val="000000"/>
                 </a:solidFill>
@@ -41636,7 +41271,7 @@
               </a:rPr>
               <a:t>TRUE &amp; FALSE    # evaluates to FALSE</a:t>
             </a:r>
-            <a:endParaRPr lang="en-GB" sz="2180" b="0" strike="noStrike" spc="-1">
+            <a:endParaRPr lang="en-GB" sz="2180" b="0" strike="noStrike" spc="-1" dirty="0">
               <a:latin typeface="Arial"/>
             </a:endParaRPr>
           </a:p>
@@ -41655,7 +41290,7 @@
               <a:buChar char="•"/>
             </a:pPr>
             <a:r>
-              <a:rPr lang="en-GB" sz="2180" b="0" strike="noStrike" spc="-1">
+              <a:rPr lang="en-GB" sz="2180" b="0" strike="noStrike" spc="-1" dirty="0">
                 <a:solidFill>
                   <a:srgbClr val="000000"/>
                 </a:solidFill>
@@ -41664,7 +41299,7 @@
               </a:rPr>
               <a:t>FALSE &amp; FALSE   # evaluates to FALSE</a:t>
             </a:r>
-            <a:endParaRPr lang="en-GB" sz="2180" b="0" strike="noStrike" spc="-1">
+            <a:endParaRPr lang="en-GB" sz="2180" b="0" strike="noStrike" spc="-1" dirty="0">
               <a:latin typeface="Arial"/>
             </a:endParaRPr>
           </a:p>
@@ -41683,7 +41318,7 @@
               <a:buChar char="•"/>
             </a:pPr>
             <a:r>
-              <a:rPr lang="en-GB" sz="2180" b="0" strike="noStrike" spc="-1">
+              <a:rPr lang="en-GB" sz="2180" b="0" strike="noStrike" spc="-1" dirty="0">
                 <a:solidFill>
                   <a:srgbClr val="000000"/>
                 </a:solidFill>
@@ -41692,7 +41327,31 @@
               </a:rPr>
               <a:t>TRUE | FALSE     # evaluates to TRUE</a:t>
             </a:r>
-            <a:endParaRPr lang="en-GB" sz="2180" b="0" strike="noStrike" spc="-1">
+          </a:p>
+          <a:p>
+            <a:pPr marL="343080" indent="-342000">
+              <a:lnSpc>
+                <a:spcPct val="100000"/>
+              </a:lnSpc>
+              <a:spcBef>
+                <a:spcPts val="437"/>
+              </a:spcBef>
+              <a:buClr>
+                <a:srgbClr val="000000"/>
+              </a:buClr>
+              <a:buFont typeface="Arial"/>
+              <a:buChar char="•"/>
+            </a:pPr>
+            <a:r>
+              <a:rPr lang="en-GB" sz="2180" spc="-1" dirty="0">
+                <a:solidFill>
+                  <a:srgbClr val="000000"/>
+                </a:solidFill>
+                <a:latin typeface="Calibri"/>
+              </a:rPr>
+              <a:t>!TRUE # evaluates to FALSE</a:t>
+            </a:r>
+            <a:endParaRPr lang="en-GB" sz="2180" b="0" strike="noStrike" spc="-1" dirty="0">
               <a:latin typeface="Arial"/>
             </a:endParaRPr>
           </a:p>
@@ -41708,7 +41367,7 @@
                 <a:tab pos="0" algn="l"/>
               </a:tabLst>
             </a:pPr>
-            <a:endParaRPr lang="en-GB" sz="2180" b="0" strike="noStrike" spc="-1">
+            <a:endParaRPr lang="en-GB" sz="2180" b="0" strike="noStrike" spc="-1" dirty="0">
               <a:latin typeface="Arial"/>
             </a:endParaRPr>
           </a:p>
@@ -41721,7 +41380,7 @@
                 <a:tab pos="0" algn="l"/>
               </a:tabLst>
             </a:pPr>
-            <a:endParaRPr lang="en-GB" sz="2180" b="0" strike="noStrike" spc="-1">
+            <a:endParaRPr lang="en-GB" sz="2180" b="0" strike="noStrike" spc="-1" dirty="0">
               <a:latin typeface="Arial"/>
             </a:endParaRPr>
           </a:p>
@@ -41737,7 +41396,7 @@
                 <a:tab pos="0" algn="l"/>
               </a:tabLst>
             </a:pPr>
-            <a:endParaRPr lang="en-GB" sz="2180" b="0" strike="noStrike" spc="-1">
+            <a:endParaRPr lang="en-GB" sz="2180" b="0" strike="noStrike" spc="-1" dirty="0">
               <a:latin typeface="Arial"/>
             </a:endParaRPr>
           </a:p>
@@ -41881,6 +41540,83 @@
           </a:p>
         </p:txBody>
       </p:sp>
+      <p:sp>
+        <p:nvSpPr>
+          <p:cNvPr id="5" name="CustomShape 1">
+            <a:extLst>
+              <a:ext uri="{FF2B5EF4-FFF2-40B4-BE49-F238E27FC236}">
+                <a16:creationId xmlns:a16="http://schemas.microsoft.com/office/drawing/2014/main" id="{A80E7D07-7ADA-4556-888E-5C06D603C94C}"/>
+              </a:ext>
+            </a:extLst>
+          </p:cNvPr>
+          <p:cNvSpPr/>
+          <p:nvPr/>
+        </p:nvSpPr>
+        <p:spPr>
+          <a:xfrm>
+            <a:off x="474120" y="582480"/>
+            <a:ext cx="8227800" cy="1143720"/>
+          </a:xfrm>
+          <a:prstGeom prst="rect">
+            <a:avLst/>
+          </a:prstGeom>
+          <a:noFill/>
+          <a:ln>
+            <a:noFill/>
+          </a:ln>
+        </p:spPr>
+        <p:style>
+          <a:lnRef idx="0">
+            <a:scrgbClr r="0" g="0" b="0"/>
+          </a:lnRef>
+          <a:fillRef idx="0">
+            <a:scrgbClr r="0" g="0" b="0"/>
+          </a:fillRef>
+          <a:effectRef idx="0">
+            <a:scrgbClr r="0" g="0" b="0"/>
+          </a:effectRef>
+          <a:fontRef idx="minor"/>
+        </p:style>
+        <p:txBody>
+          <a:bodyPr lIns="0" tIns="0" rIns="0" bIns="0" anchor="ctr">
+            <a:noAutofit/>
+          </a:bodyPr>
+          <a:lstStyle/>
+          <a:p>
+            <a:pPr algn="ctr">
+              <a:lnSpc>
+                <a:spcPct val="100000"/>
+              </a:lnSpc>
+            </a:pPr>
+            <a:r>
+              <a:rPr lang="en-GB" sz="4400" b="1" strike="noStrike" spc="-1" dirty="0">
+                <a:solidFill>
+                  <a:srgbClr val="000000"/>
+                </a:solidFill>
+                <a:latin typeface="Calibri"/>
+                <a:ea typeface="DejaVu Sans"/>
+              </a:rPr>
+              <a:t>Logical operators</a:t>
+            </a:r>
+            <a:br>
+              <a:rPr dirty="0"/>
+            </a:br>
+            <a:r>
+              <a:rPr lang="en-GB" sz="3200" b="1" strike="noStrike" spc="-1" dirty="0">
+                <a:solidFill>
+                  <a:srgbClr val="000000"/>
+                </a:solidFill>
+                <a:latin typeface="Calibri"/>
+                <a:ea typeface="DejaVu Sans"/>
+              </a:rPr>
+              <a:t>(Boolean operations)</a:t>
+            </a:r>
+            <a:endParaRPr lang="en-GB" sz="3200" b="0" strike="noStrike" spc="-1" dirty="0">
+              <a:latin typeface="Arial"/>
+            </a:endParaRPr>
+          </a:p>
+        </p:txBody>
+      </p:sp>
     </p:spTree>
   </p:cSld>
   <p:clrMapOvr>
@@ -41889,7 +41625,7 @@
 </p:sld>
 </file>
 
-<file path=ppt/slides/slide27.xml><?xml version="1.0" encoding="utf-8"?>
+<file path=ppt/slides/slide26.xml><?xml version="1.0" encoding="utf-8"?>
 <p:sld xmlns:a="http://schemas.openxmlformats.org/drawingml/2006/main" xmlns:r="http://schemas.openxmlformats.org/officeDocument/2006/relationships" xmlns:p="http://schemas.openxmlformats.org/presentationml/2006/main">
   <p:cSld>
     <p:bg>
@@ -42716,14 +42452,14 @@
               <a:buChar char=""/>
             </a:pPr>
             <a:r>
-              <a:rPr lang="en-US" sz="1600" b="0" strike="noStrike" spc="-1" dirty="0">
+              <a:rPr lang="en-GB" sz="1600" b="0" strike="noStrike" spc="-1" dirty="0">
                 <a:solidFill>
                   <a:srgbClr val="000000"/>
                 </a:solidFill>
                 <a:latin typeface="Calibri"/>
                 <a:ea typeface="DejaVu Sans"/>
               </a:rPr>
-              <a:t>Data structures</a:t>
+              <a:t>Loading data</a:t>
             </a:r>
             <a:endParaRPr lang="en-GB" sz="1600" b="0" strike="noStrike" spc="-1" dirty="0">
               <a:latin typeface="Arial"/>
@@ -42756,6 +42492,44 @@
                 <a:ea typeface="DejaVu Sans"/>
               </a:rPr>
               <a:t>Subsetting</a:t>
+            </a:r>
+            <a:r>
+              <a:rPr lang="en-US" sz="1640" b="0" strike="noStrike" spc="-1" dirty="0">
+                <a:solidFill>
+                  <a:srgbClr val="000000"/>
+                </a:solidFill>
+                <a:latin typeface="Calibri"/>
+                <a:ea typeface="DejaVu Sans"/>
+              </a:rPr>
+              <a:t> data</a:t>
+            </a:r>
+          </a:p>
+          <a:p>
+            <a:pPr marL="457200" lvl="1" indent="-215280">
+              <a:lnSpc>
+                <a:spcPct val="100000"/>
+              </a:lnSpc>
+              <a:spcBef>
+                <a:spcPts val="326"/>
+              </a:spcBef>
+              <a:spcAft>
+                <a:spcPts val="544"/>
+              </a:spcAft>
+              <a:buClr>
+                <a:srgbClr val="000000"/>
+              </a:buClr>
+              <a:buSzPct val="80000"/>
+              <a:buFont typeface="Wingdings 3" charset="2"/>
+              <a:buChar char=""/>
+            </a:pPr>
+            <a:r>
+              <a:rPr lang="en-US" sz="1640" spc="-1" dirty="0">
+                <a:solidFill>
+                  <a:srgbClr val="000000"/>
+                </a:solidFill>
+                <a:latin typeface="Calibri"/>
+              </a:rPr>
+              <a:t>Filtering</a:t>
             </a:r>
             <a:endParaRPr lang="en-GB" sz="1640" b="0" strike="noStrike" spc="-1" dirty="0">
               <a:latin typeface="Arial"/>

</xml_diff>